<commit_message>
Atu PPT e CPU 128bits 13092022
</commit_message>
<xml_diff>
--- a/01 Classes/Aula 00 - Arquitetura de Computadores.pptx
+++ b/01 Classes/Aula 00 - Arquitetura de Computadores.pptx
@@ -7966,12 +7966,12 @@
               </a:rPr>
             </a:br>
             <a:r>
-              <a:rPr lang="pt-BR" b="1" dirty="0">
+              <a:rPr lang="pt-BR" b="1">
                 <a:solidFill>
                   <a:schemeClr val="bg1"/>
                 </a:solidFill>
               </a:rPr>
-              <a:t>Aula 01 e 02</a:t>
+              <a:t>Aula 00</a:t>
             </a:r>
             <a:br>
               <a:rPr lang="pt-BR" b="1" dirty="0">
@@ -9645,15 +9645,7 @@
                 <a:cs typeface="Times New Roman" panose="02020603050405020304" pitchFamily="18" charset="0"/>
                 <a:hlinkClick r:id="rId3"/>
               </a:rPr>
-              <a:t>h</a:t>
-            </a:r>
-            <a:r>
-              <a:rPr lang="pt-BR" sz="1800" dirty="0">
-                <a:latin typeface="Times New Roman" panose="02020603050405020304" pitchFamily="18" charset="0"/>
-                <a:cs typeface="Times New Roman" panose="02020603050405020304" pitchFamily="18" charset="0"/>
-                <a:hlinkClick r:id="rId3"/>
-              </a:rPr>
-              <a:t>ttp://www.proedu.rnp.br/bitstream/handle/123456789/697/Arquitetura_de_Computadores_web.pdf?sequence=3&amp;isAllowed=y</a:t>
+              <a:t>http://www.proedu.rnp.br/bitstream/handle/123456789/697/Arquitetura_de_Computadores_web.pdf?sequence=3&amp;isAllowed=y</a:t>
             </a:r>
             <a:endParaRPr lang="pt-BR" sz="1800" dirty="0">
               <a:latin typeface="Times New Roman" panose="02020603050405020304" pitchFamily="18" charset="0"/>

</xml_diff>